<commit_message>
update cost function 2b
</commit_message>
<xml_diff>
--- a/html/ML-Course/Intro-to-ML-with-Python/images/Image Creation.pptx
+++ b/html/ML-Course/Intro-to-ML-with-Python/images/Image Creation.pptx
@@ -3976,8 +3976,8 @@
           </a:p>
         </p:txBody>
       </p:sp>
-      <mc:AlternateContent xmlns:mc="http://schemas.openxmlformats.org/markup-compatibility/2006">
-        <mc:Choice xmlns:a14="http://schemas.microsoft.com/office/drawing/2010/main" Requires="a14">
+      <mc:AlternateContent xmlns:mc="http://schemas.openxmlformats.org/markup-compatibility/2006" xmlns:a14="http://schemas.microsoft.com/office/drawing/2010/main">
+        <mc:Choice Requires="a14">
           <p:sp>
             <p:nvSpPr>
               <p:cNvPr id="8" name="TextBox 7">
@@ -4006,6 +4006,7 @@
               </a:bodyPr>
               <a:lstStyle/>
               <a:p>
+                <a:pPr/>
                 <a14:m>
                   <m:oMathPara xmlns:m="http://schemas.openxmlformats.org/officeDocument/2006/math">
                     <m:oMathParaPr>
@@ -4192,7 +4193,7 @@
             </p:txBody>
           </p:sp>
         </mc:Choice>
-        <mc:Fallback>
+        <mc:Fallback xmlns="">
           <p:sp>
             <p:nvSpPr>
               <p:cNvPr id="8" name="TextBox 7">
@@ -4237,8 +4238,8 @@
           </p:sp>
         </mc:Fallback>
       </mc:AlternateContent>
-      <mc:AlternateContent xmlns:mc="http://schemas.openxmlformats.org/markup-compatibility/2006">
-        <mc:Choice xmlns:a14="http://schemas.microsoft.com/office/drawing/2010/main" Requires="a14">
+      <mc:AlternateContent xmlns:mc="http://schemas.openxmlformats.org/markup-compatibility/2006" xmlns:a14="http://schemas.microsoft.com/office/drawing/2010/main">
+        <mc:Choice Requires="a14">
           <p:sp>
             <p:nvSpPr>
               <p:cNvPr id="9" name="TextBox 8">
@@ -4267,6 +4268,7 @@
               </a:bodyPr>
               <a:lstStyle/>
               <a:p>
+                <a:pPr/>
                 <a14:m>
                   <m:oMathPara xmlns:m="http://schemas.openxmlformats.org/officeDocument/2006/math">
                     <m:oMathParaPr>
@@ -4411,7 +4413,7 @@
             </p:txBody>
           </p:sp>
         </mc:Choice>
-        <mc:Fallback>
+        <mc:Fallback xmlns="">
           <p:sp>
             <p:nvSpPr>
               <p:cNvPr id="9" name="TextBox 8">
@@ -4472,8 +4474,8 @@
             </p:nvSpPr>
             <p:spPr>
               <a:xfrm>
-                <a:off x="3915184" y="5808448"/>
-                <a:ext cx="3337965" cy="365998"/>
+                <a:off x="2375883" y="5186279"/>
+                <a:ext cx="5283947" cy="365998"/>
               </a:xfrm>
               <a:prstGeom prst="rect">
                 <a:avLst/>
@@ -4486,6 +4488,7 @@
               </a:bodyPr>
               <a:lstStyle/>
               <a:p>
+                <a:pPr/>
                 <a14:m>
                   <m:oMathPara xmlns:m="http://schemas.openxmlformats.org/officeDocument/2006/math">
                     <m:oMathParaPr>
@@ -4665,6 +4668,104 @@
                               </m:r>
                             </m:sup>
                           </m:sSup>
+                          <m:r>
+                            <a:rPr lang="en-US" b="0" i="1" smtClean="0">
+                              <a:latin typeface="Cambria Math" panose="02040503050406030204" pitchFamily="18" charset="0"/>
+                              <a:ea typeface="Cambria Math" panose="02040503050406030204" pitchFamily="18" charset="0"/>
+                            </a:rPr>
+                            <m:t>=</m:t>
+                          </m:r>
+                          <m:func>
+                            <m:funcPr>
+                              <m:ctrlPr>
+                                <a:rPr lang="en-US" i="1">
+                                  <a:latin typeface="Cambria Math" panose="02040503050406030204" pitchFamily="18" charset="0"/>
+                                </a:rPr>
+                              </m:ctrlPr>
+                            </m:funcPr>
+                            <m:fName>
+                              <m:limLow>
+                                <m:limLowPr>
+                                  <m:ctrlPr>
+                                    <a:rPr lang="en-US" i="1">
+                                      <a:latin typeface="Cambria Math" panose="02040503050406030204" pitchFamily="18" charset="0"/>
+                                    </a:rPr>
+                                  </m:ctrlPr>
+                                </m:limLowPr>
+                                <m:e>
+                                  <m:r>
+                                    <m:rPr>
+                                      <m:sty m:val="p"/>
+                                    </m:rPr>
+                                    <a:rPr lang="en-US">
+                                      <a:latin typeface="Cambria Math" panose="02040503050406030204" pitchFamily="18" charset="0"/>
+                                    </a:rPr>
+                                    <m:t>min</m:t>
+                                  </m:r>
+                                </m:e>
+                                <m:lim>
+                                  <m:r>
+                                    <a:rPr lang="en-US" i="1">
+                                      <a:latin typeface="Cambria Math" panose="02040503050406030204" pitchFamily="18" charset="0"/>
+                                    </a:rPr>
+                                    <m:t>𝑤</m:t>
+                                  </m:r>
+                                </m:lim>
+                              </m:limLow>
+                            </m:fName>
+                            <m:e>
+                              <m:sSup>
+                                <m:sSupPr>
+                                  <m:ctrlPr>
+                                    <a:rPr lang="en-US" i="1">
+                                      <a:latin typeface="Cambria Math" panose="02040503050406030204" pitchFamily="18" charset="0"/>
+                                    </a:rPr>
+                                  </m:ctrlPr>
+                                </m:sSupPr>
+                                <m:e>
+                                  <m:d>
+                                    <m:dPr>
+                                      <m:begChr m:val="‖"/>
+                                      <m:endChr m:val="‖"/>
+                                      <m:ctrlPr>
+                                        <a:rPr lang="en-US" i="1">
+                                          <a:latin typeface="Cambria Math" panose="02040503050406030204" pitchFamily="18" charset="0"/>
+                                        </a:rPr>
+                                      </m:ctrlPr>
+                                    </m:dPr>
+                                    <m:e>
+                                      <m:r>
+                                        <a:rPr lang="en-US" i="1">
+                                          <a:latin typeface="Cambria Math" panose="02040503050406030204" pitchFamily="18" charset="0"/>
+                                        </a:rPr>
+                                        <m:t>𝑦</m:t>
+                                      </m:r>
+                                      <m:r>
+                                        <a:rPr lang="en-US" i="1">
+                                          <a:latin typeface="Cambria Math" panose="02040503050406030204" pitchFamily="18" charset="0"/>
+                                        </a:rPr>
+                                        <m:t>−</m:t>
+                                      </m:r>
+                                      <m:r>
+                                        <a:rPr lang="en-US" i="1">
+                                          <a:latin typeface="Cambria Math" panose="02040503050406030204" pitchFamily="18" charset="0"/>
+                                        </a:rPr>
+                                        <m:t>𝑋𝑤</m:t>
+                                      </m:r>
+                                    </m:e>
+                                  </m:d>
+                                </m:e>
+                                <m:sup>
+                                  <m:r>
+                                    <a:rPr lang="en-US" i="1">
+                                      <a:latin typeface="Cambria Math" panose="02040503050406030204" pitchFamily="18" charset="0"/>
+                                    </a:rPr>
+                                    <m:t>2</m:t>
+                                  </m:r>
+                                </m:sup>
+                              </m:sSup>
+                            </m:e>
+                          </m:func>
                         </m:e>
                       </m:func>
                       <m:r>
@@ -4698,8 +4799,8 @@
             </p:nvSpPr>
             <p:spPr>
               <a:xfrm>
-                <a:off x="3915184" y="5808448"/>
-                <a:ext cx="3337965" cy="365998"/>
+                <a:off x="2375883" y="5186279"/>
+                <a:ext cx="5283947" cy="365998"/>
               </a:xfrm>
               <a:prstGeom prst="rect">
                 <a:avLst/>
@@ -4707,7 +4808,7 @@
               <a:blipFill>
                 <a:blip r:embed="rId4"/>
                 <a:stretch>
-                  <a:fillRect l="-1825" b="-11667"/>
+                  <a:fillRect b="-11667"/>
                 </a:stretch>
               </a:blipFill>
             </p:spPr>
@@ -4726,8 +4827,8 @@
           </p:sp>
         </mc:Fallback>
       </mc:AlternateContent>
-      <mc:AlternateContent xmlns:mc="http://schemas.openxmlformats.org/markup-compatibility/2006">
-        <mc:Choice xmlns:a14="http://schemas.microsoft.com/office/drawing/2010/main" Requires="a14">
+      <mc:AlternateContent xmlns:mc="http://schemas.openxmlformats.org/markup-compatibility/2006" xmlns:a14="http://schemas.microsoft.com/office/drawing/2010/main">
+        <mc:Choice Requires="a14">
           <p:sp>
             <p:nvSpPr>
               <p:cNvPr id="12" name="TextBox 11">
@@ -4756,6 +4857,7 @@
               </a:bodyPr>
               <a:lstStyle/>
               <a:p>
+                <a:pPr/>
                 <a14:m>
                   <m:oMathPara xmlns:m="http://schemas.openxmlformats.org/officeDocument/2006/math">
                     <m:oMathParaPr>
@@ -4896,7 +4998,7 @@
             </p:txBody>
           </p:sp>
         </mc:Choice>
-        <mc:Fallback>
+        <mc:Fallback xmlns="">
           <p:sp>
             <p:nvSpPr>
               <p:cNvPr id="12" name="TextBox 11">

</xml_diff>